<commit_message>
McCabe AHORA CON CUADRITO!!!!!
GRANDE COCO
</commit_message>
<xml_diff>
--- a/Complejidad Ciclomatica Triangulo.pptx
+++ b/Complejidad Ciclomatica Triangulo.pptx
@@ -5,13 +5,14 @@
     <p:sldMasterId id="2147483660" r:id="rId1"/>
   </p:sldMasterIdLst>
   <p:notesMasterIdLst>
-    <p:notesMasterId r:id="rId6"/>
+    <p:notesMasterId r:id="rId7"/>
   </p:notesMasterIdLst>
   <p:sldIdLst>
     <p:sldId id="256" r:id="rId2"/>
     <p:sldId id="258" r:id="rId3"/>
     <p:sldId id="259" r:id="rId4"/>
-    <p:sldId id="257" r:id="rId5"/>
+    <p:sldId id="260" r:id="rId5"/>
+    <p:sldId id="257" r:id="rId6"/>
   </p:sldIdLst>
   <p:sldSz cx="9144000" cy="6858000" type="screen4x3"/>
   <p:notesSz cx="6858000" cy="9144000"/>
@@ -122,6 +123,7 @@
           <p14:sldIdLst>
             <p14:sldId id="258"/>
             <p14:sldId id="259"/>
+            <p14:sldId id="260"/>
             <p14:sldId id="257"/>
           </p14:sldIdLst>
         </p14:section>
@@ -216,7 +218,7 @@
           <a:p>
             <a:fld id="{6D2C6710-438B-4332-B97D-2FD4458EAA24}" type="datetimeFigureOut">
               <a:rPr lang="es-AR" smtClean="0"/>
-              <a:t>16/9/2018</a:t>
+              <a:t>10/10/2018</a:t>
             </a:fld>
             <a:endParaRPr lang="es-AR"/>
           </a:p>
@@ -699,7 +701,7 @@
           <a:p>
             <a:fld id="{1259EB10-FC57-4C03-B327-035A53E7A135}" type="datetimeFigureOut">
               <a:rPr lang="es-AR" smtClean="0"/>
-              <a:t>15/9/2018</a:t>
+              <a:t>10/10/2018</a:t>
             </a:fld>
             <a:endParaRPr lang="es-AR"/>
           </a:p>
@@ -869,7 +871,7 @@
           <a:p>
             <a:fld id="{1259EB10-FC57-4C03-B327-035A53E7A135}" type="datetimeFigureOut">
               <a:rPr lang="es-AR" smtClean="0"/>
-              <a:t>15/9/2018</a:t>
+              <a:t>10/10/2018</a:t>
             </a:fld>
             <a:endParaRPr lang="es-AR"/>
           </a:p>
@@ -1049,7 +1051,7 @@
           <a:p>
             <a:fld id="{1259EB10-FC57-4C03-B327-035A53E7A135}" type="datetimeFigureOut">
               <a:rPr lang="es-AR" smtClean="0"/>
-              <a:t>15/9/2018</a:t>
+              <a:t>10/10/2018</a:t>
             </a:fld>
             <a:endParaRPr lang="es-AR"/>
           </a:p>
@@ -1219,7 +1221,7 @@
           <a:p>
             <a:fld id="{1259EB10-FC57-4C03-B327-035A53E7A135}" type="datetimeFigureOut">
               <a:rPr lang="es-AR" smtClean="0"/>
-              <a:t>15/9/2018</a:t>
+              <a:t>10/10/2018</a:t>
             </a:fld>
             <a:endParaRPr lang="es-AR"/>
           </a:p>
@@ -1463,7 +1465,7 @@
           <a:p>
             <a:fld id="{1259EB10-FC57-4C03-B327-035A53E7A135}" type="datetimeFigureOut">
               <a:rPr lang="es-AR" smtClean="0"/>
-              <a:t>15/9/2018</a:t>
+              <a:t>10/10/2018</a:t>
             </a:fld>
             <a:endParaRPr lang="es-AR"/>
           </a:p>
@@ -1695,7 +1697,7 @@
           <a:p>
             <a:fld id="{1259EB10-FC57-4C03-B327-035A53E7A135}" type="datetimeFigureOut">
               <a:rPr lang="es-AR" smtClean="0"/>
-              <a:t>15/9/2018</a:t>
+              <a:t>10/10/2018</a:t>
             </a:fld>
             <a:endParaRPr lang="es-AR"/>
           </a:p>
@@ -2062,7 +2064,7 @@
           <a:p>
             <a:fld id="{1259EB10-FC57-4C03-B327-035A53E7A135}" type="datetimeFigureOut">
               <a:rPr lang="es-AR" smtClean="0"/>
-              <a:t>15/9/2018</a:t>
+              <a:t>10/10/2018</a:t>
             </a:fld>
             <a:endParaRPr lang="es-AR"/>
           </a:p>
@@ -2180,7 +2182,7 @@
           <a:p>
             <a:fld id="{1259EB10-FC57-4C03-B327-035A53E7A135}" type="datetimeFigureOut">
               <a:rPr lang="es-AR" smtClean="0"/>
-              <a:t>15/9/2018</a:t>
+              <a:t>10/10/2018</a:t>
             </a:fld>
             <a:endParaRPr lang="es-AR"/>
           </a:p>
@@ -2275,7 +2277,7 @@
           <a:p>
             <a:fld id="{1259EB10-FC57-4C03-B327-035A53E7A135}" type="datetimeFigureOut">
               <a:rPr lang="es-AR" smtClean="0"/>
-              <a:t>15/9/2018</a:t>
+              <a:t>10/10/2018</a:t>
             </a:fld>
             <a:endParaRPr lang="es-AR"/>
           </a:p>
@@ -2552,7 +2554,7 @@
           <a:p>
             <a:fld id="{1259EB10-FC57-4C03-B327-035A53E7A135}" type="datetimeFigureOut">
               <a:rPr lang="es-AR" smtClean="0"/>
-              <a:t>15/9/2018</a:t>
+              <a:t>10/10/2018</a:t>
             </a:fld>
             <a:endParaRPr lang="es-AR"/>
           </a:p>
@@ -2809,7 +2811,7 @@
           <a:p>
             <a:fld id="{1259EB10-FC57-4C03-B327-035A53E7A135}" type="datetimeFigureOut">
               <a:rPr lang="es-AR" smtClean="0"/>
-              <a:t>15/9/2018</a:t>
+              <a:t>10/10/2018</a:t>
             </a:fld>
             <a:endParaRPr lang="es-AR"/>
           </a:p>
@@ -3022,7 +3024,7 @@
           <a:p>
             <a:fld id="{1259EB10-FC57-4C03-B327-035A53E7A135}" type="datetimeFigureOut">
               <a:rPr lang="es-AR" smtClean="0"/>
-              <a:t>15/9/2018</a:t>
+              <a:t>10/10/2018</a:t>
             </a:fld>
             <a:endParaRPr lang="es-AR"/>
           </a:p>
@@ -3432,7 +3434,7 @@
           <p:cNvPr id="12" name="Diagrama de flujo: conector 11">
             <a:extLst>
               <a:ext uri="{FF2B5EF4-FFF2-40B4-BE49-F238E27FC236}">
-                <a16:creationId xmlns:a16="http://schemas.microsoft.com/office/drawing/2014/main" xmlns="" id="{C07E034C-B5EE-4D5E-B551-690252C04895}"/>
+                <a16:creationId xmlns="" xmlns:a16="http://schemas.microsoft.com/office/drawing/2014/main" id="{C07E034C-B5EE-4D5E-B551-690252C04895}"/>
               </a:ext>
             </a:extLst>
           </p:cNvPr>
@@ -3494,7 +3496,7 @@
           <p:cNvPr id="13" name="Diagrama de flujo: conector 12">
             <a:extLst>
               <a:ext uri="{FF2B5EF4-FFF2-40B4-BE49-F238E27FC236}">
-                <a16:creationId xmlns:a16="http://schemas.microsoft.com/office/drawing/2014/main" xmlns="" id="{19A7BB2B-A4D8-41FF-86E4-C4B33628906A}"/>
+                <a16:creationId xmlns="" xmlns:a16="http://schemas.microsoft.com/office/drawing/2014/main" id="{19A7BB2B-A4D8-41FF-86E4-C4B33628906A}"/>
               </a:ext>
             </a:extLst>
           </p:cNvPr>
@@ -3556,7 +3558,7 @@
           <p:cNvPr id="14" name="Diagrama de flujo: conector 13">
             <a:extLst>
               <a:ext uri="{FF2B5EF4-FFF2-40B4-BE49-F238E27FC236}">
-                <a16:creationId xmlns:a16="http://schemas.microsoft.com/office/drawing/2014/main" xmlns="" id="{15F2E4A4-6AAC-4A5B-AC64-D2B022D1BC2B}"/>
+                <a16:creationId xmlns="" xmlns:a16="http://schemas.microsoft.com/office/drawing/2014/main" id="{15F2E4A4-6AAC-4A5B-AC64-D2B022D1BC2B}"/>
               </a:ext>
             </a:extLst>
           </p:cNvPr>
@@ -3618,7 +3620,7 @@
           <p:cNvPr id="15" name="Diagrama de flujo: conector 14">
             <a:extLst>
               <a:ext uri="{FF2B5EF4-FFF2-40B4-BE49-F238E27FC236}">
-                <a16:creationId xmlns:a16="http://schemas.microsoft.com/office/drawing/2014/main" xmlns="" id="{FD04720A-8CFC-4EF1-ACCC-952499DD98F3}"/>
+                <a16:creationId xmlns="" xmlns:a16="http://schemas.microsoft.com/office/drawing/2014/main" id="{FD04720A-8CFC-4EF1-ACCC-952499DD98F3}"/>
               </a:ext>
             </a:extLst>
           </p:cNvPr>
@@ -3680,7 +3682,7 @@
           <p:cNvPr id="16" name="Diagrama de flujo: conector 15">
             <a:extLst>
               <a:ext uri="{FF2B5EF4-FFF2-40B4-BE49-F238E27FC236}">
-                <a16:creationId xmlns:a16="http://schemas.microsoft.com/office/drawing/2014/main" xmlns="" id="{BEB68F6B-6417-46F7-BD84-78DA64505F48}"/>
+                <a16:creationId xmlns="" xmlns:a16="http://schemas.microsoft.com/office/drawing/2014/main" id="{BEB68F6B-6417-46F7-BD84-78DA64505F48}"/>
               </a:ext>
             </a:extLst>
           </p:cNvPr>
@@ -3742,7 +3744,7 @@
           <p:cNvPr id="17" name="Diagrama de flujo: conector 16">
             <a:extLst>
               <a:ext uri="{FF2B5EF4-FFF2-40B4-BE49-F238E27FC236}">
-                <a16:creationId xmlns:a16="http://schemas.microsoft.com/office/drawing/2014/main" xmlns="" id="{B0D86F5D-9096-424A-B353-613D9B2700FF}"/>
+                <a16:creationId xmlns="" xmlns:a16="http://schemas.microsoft.com/office/drawing/2014/main" id="{B0D86F5D-9096-424A-B353-613D9B2700FF}"/>
               </a:ext>
             </a:extLst>
           </p:cNvPr>
@@ -3804,7 +3806,7 @@
           <p:cNvPr id="18" name="Diagrama de flujo: conector 17">
             <a:extLst>
               <a:ext uri="{FF2B5EF4-FFF2-40B4-BE49-F238E27FC236}">
-                <a16:creationId xmlns:a16="http://schemas.microsoft.com/office/drawing/2014/main" xmlns="" id="{5013B220-AA5E-45E0-88BD-561C345EF024}"/>
+                <a16:creationId xmlns="" xmlns:a16="http://schemas.microsoft.com/office/drawing/2014/main" id="{5013B220-AA5E-45E0-88BD-561C345EF024}"/>
               </a:ext>
             </a:extLst>
           </p:cNvPr>
@@ -3866,7 +3868,7 @@
           <p:cNvPr id="19" name="Diagrama de flujo: conector 18">
             <a:extLst>
               <a:ext uri="{FF2B5EF4-FFF2-40B4-BE49-F238E27FC236}">
-                <a16:creationId xmlns:a16="http://schemas.microsoft.com/office/drawing/2014/main" xmlns="" id="{813E91EA-062C-439D-A943-3E0E634B9A72}"/>
+                <a16:creationId xmlns="" xmlns:a16="http://schemas.microsoft.com/office/drawing/2014/main" id="{813E91EA-062C-439D-A943-3E0E634B9A72}"/>
               </a:ext>
             </a:extLst>
           </p:cNvPr>
@@ -3928,7 +3930,7 @@
           <p:cNvPr id="20" name="Diagrama de flujo: conector 19">
             <a:extLst>
               <a:ext uri="{FF2B5EF4-FFF2-40B4-BE49-F238E27FC236}">
-                <a16:creationId xmlns:a16="http://schemas.microsoft.com/office/drawing/2014/main" xmlns="" id="{6C86E10D-C4D7-4099-861D-BC9E876C5DDF}"/>
+                <a16:creationId xmlns="" xmlns:a16="http://schemas.microsoft.com/office/drawing/2014/main" id="{6C86E10D-C4D7-4099-861D-BC9E876C5DDF}"/>
               </a:ext>
             </a:extLst>
           </p:cNvPr>
@@ -3990,7 +3992,7 @@
           <p:cNvPr id="21" name="Diagrama de flujo: conector 20">
             <a:extLst>
               <a:ext uri="{FF2B5EF4-FFF2-40B4-BE49-F238E27FC236}">
-                <a16:creationId xmlns:a16="http://schemas.microsoft.com/office/drawing/2014/main" xmlns="" id="{07AE0D68-367D-4CBC-AA3B-DA3A53F1F7B9}"/>
+                <a16:creationId xmlns="" xmlns:a16="http://schemas.microsoft.com/office/drawing/2014/main" id="{07AE0D68-367D-4CBC-AA3B-DA3A53F1F7B9}"/>
               </a:ext>
             </a:extLst>
           </p:cNvPr>
@@ -4052,7 +4054,7 @@
           <p:cNvPr id="22" name="Diagrama de flujo: conector 21">
             <a:extLst>
               <a:ext uri="{FF2B5EF4-FFF2-40B4-BE49-F238E27FC236}">
-                <a16:creationId xmlns:a16="http://schemas.microsoft.com/office/drawing/2014/main" xmlns="" id="{76F4E711-D924-4938-ADD6-95D94013436B}"/>
+                <a16:creationId xmlns="" xmlns:a16="http://schemas.microsoft.com/office/drawing/2014/main" id="{76F4E711-D924-4938-ADD6-95D94013436B}"/>
               </a:ext>
             </a:extLst>
           </p:cNvPr>
@@ -4114,7 +4116,7 @@
           <p:cNvPr id="23" name="Diagrama de flujo: conector 22">
             <a:extLst>
               <a:ext uri="{FF2B5EF4-FFF2-40B4-BE49-F238E27FC236}">
-                <a16:creationId xmlns:a16="http://schemas.microsoft.com/office/drawing/2014/main" xmlns="" id="{71A89DFB-2C59-4CC5-9490-3C2893F3FCF0}"/>
+                <a16:creationId xmlns="" xmlns:a16="http://schemas.microsoft.com/office/drawing/2014/main" id="{71A89DFB-2C59-4CC5-9490-3C2893F3FCF0}"/>
               </a:ext>
             </a:extLst>
           </p:cNvPr>
@@ -4176,7 +4178,7 @@
           <p:cNvPr id="24" name="Diagrama de flujo: conector 23">
             <a:extLst>
               <a:ext uri="{FF2B5EF4-FFF2-40B4-BE49-F238E27FC236}">
-                <a16:creationId xmlns:a16="http://schemas.microsoft.com/office/drawing/2014/main" xmlns="" id="{E5D094DC-F8AF-44E6-80E0-F10AA18F9DC0}"/>
+                <a16:creationId xmlns="" xmlns:a16="http://schemas.microsoft.com/office/drawing/2014/main" id="{E5D094DC-F8AF-44E6-80E0-F10AA18F9DC0}"/>
               </a:ext>
             </a:extLst>
           </p:cNvPr>
@@ -4238,7 +4240,7 @@
           <p:cNvPr id="25" name="Diagrama de flujo: conector 24">
             <a:extLst>
               <a:ext uri="{FF2B5EF4-FFF2-40B4-BE49-F238E27FC236}">
-                <a16:creationId xmlns:a16="http://schemas.microsoft.com/office/drawing/2014/main" xmlns="" id="{51083CBF-A6AC-45D9-9208-383BB1F59078}"/>
+                <a16:creationId xmlns="" xmlns:a16="http://schemas.microsoft.com/office/drawing/2014/main" id="{51083CBF-A6AC-45D9-9208-383BB1F59078}"/>
               </a:ext>
             </a:extLst>
           </p:cNvPr>
@@ -4300,7 +4302,7 @@
           <p:cNvPr id="26" name="Diagrama de flujo: conector 25">
             <a:extLst>
               <a:ext uri="{FF2B5EF4-FFF2-40B4-BE49-F238E27FC236}">
-                <a16:creationId xmlns:a16="http://schemas.microsoft.com/office/drawing/2014/main" xmlns="" id="{540D070A-426F-4CF9-8D88-8CBB269CE346}"/>
+                <a16:creationId xmlns="" xmlns:a16="http://schemas.microsoft.com/office/drawing/2014/main" id="{540D070A-426F-4CF9-8D88-8CBB269CE346}"/>
               </a:ext>
             </a:extLst>
           </p:cNvPr>
@@ -4362,7 +4364,7 @@
           <p:cNvPr id="27" name="Diagrama de flujo: conector 26">
             <a:extLst>
               <a:ext uri="{FF2B5EF4-FFF2-40B4-BE49-F238E27FC236}">
-                <a16:creationId xmlns:a16="http://schemas.microsoft.com/office/drawing/2014/main" xmlns="" id="{4C6C6771-4EC0-46F2-B6AC-1F06C1755180}"/>
+                <a16:creationId xmlns="" xmlns:a16="http://schemas.microsoft.com/office/drawing/2014/main" id="{4C6C6771-4EC0-46F2-B6AC-1F06C1755180}"/>
               </a:ext>
             </a:extLst>
           </p:cNvPr>
@@ -4424,7 +4426,7 @@
           <p:cNvPr id="28" name="Diagrama de flujo: conector 27">
             <a:extLst>
               <a:ext uri="{FF2B5EF4-FFF2-40B4-BE49-F238E27FC236}">
-                <a16:creationId xmlns:a16="http://schemas.microsoft.com/office/drawing/2014/main" xmlns="" id="{112BC36B-A668-4524-B419-569F8E40D574}"/>
+                <a16:creationId xmlns="" xmlns:a16="http://schemas.microsoft.com/office/drawing/2014/main" id="{112BC36B-A668-4524-B419-569F8E40D574}"/>
               </a:ext>
             </a:extLst>
           </p:cNvPr>
@@ -4486,7 +4488,7 @@
           <p:cNvPr id="30" name="Conector recto de flecha 29">
             <a:extLst>
               <a:ext uri="{FF2B5EF4-FFF2-40B4-BE49-F238E27FC236}">
-                <a16:creationId xmlns:a16="http://schemas.microsoft.com/office/drawing/2014/main" xmlns="" id="{C3E1304A-37F3-4ACD-8E93-FA054EA4A9A5}"/>
+                <a16:creationId xmlns="" xmlns:a16="http://schemas.microsoft.com/office/drawing/2014/main" id="{C3E1304A-37F3-4ACD-8E93-FA054EA4A9A5}"/>
               </a:ext>
             </a:extLst>
           </p:cNvPr>
@@ -4529,7 +4531,7 @@
           <p:cNvPr id="43" name="Conector recto de flecha 42">
             <a:extLst>
               <a:ext uri="{FF2B5EF4-FFF2-40B4-BE49-F238E27FC236}">
-                <a16:creationId xmlns:a16="http://schemas.microsoft.com/office/drawing/2014/main" xmlns="" id="{02919285-D95F-42BA-BD79-118B3886A74C}"/>
+                <a16:creationId xmlns="" xmlns:a16="http://schemas.microsoft.com/office/drawing/2014/main" id="{02919285-D95F-42BA-BD79-118B3886A74C}"/>
               </a:ext>
             </a:extLst>
           </p:cNvPr>
@@ -4572,7 +4574,7 @@
           <p:cNvPr id="45" name="Conector recto de flecha 44">
             <a:extLst>
               <a:ext uri="{FF2B5EF4-FFF2-40B4-BE49-F238E27FC236}">
-                <a16:creationId xmlns:a16="http://schemas.microsoft.com/office/drawing/2014/main" xmlns="" id="{F9734440-5F22-439D-8A24-58206D729632}"/>
+                <a16:creationId xmlns="" xmlns:a16="http://schemas.microsoft.com/office/drawing/2014/main" id="{F9734440-5F22-439D-8A24-58206D729632}"/>
               </a:ext>
             </a:extLst>
           </p:cNvPr>
@@ -4615,7 +4617,7 @@
           <p:cNvPr id="47" name="Conector recto de flecha 46">
             <a:extLst>
               <a:ext uri="{FF2B5EF4-FFF2-40B4-BE49-F238E27FC236}">
-                <a16:creationId xmlns:a16="http://schemas.microsoft.com/office/drawing/2014/main" xmlns="" id="{B353D101-3D0D-4D7E-9CED-0CC7BEB06A46}"/>
+                <a16:creationId xmlns="" xmlns:a16="http://schemas.microsoft.com/office/drawing/2014/main" id="{B353D101-3D0D-4D7E-9CED-0CC7BEB06A46}"/>
               </a:ext>
             </a:extLst>
           </p:cNvPr>
@@ -4658,7 +4660,7 @@
           <p:cNvPr id="49" name="Conector recto de flecha 48">
             <a:extLst>
               <a:ext uri="{FF2B5EF4-FFF2-40B4-BE49-F238E27FC236}">
-                <a16:creationId xmlns:a16="http://schemas.microsoft.com/office/drawing/2014/main" xmlns="" id="{2BF7E59F-C234-4FBD-8AC7-513A74AA3630}"/>
+                <a16:creationId xmlns="" xmlns:a16="http://schemas.microsoft.com/office/drawing/2014/main" id="{2BF7E59F-C234-4FBD-8AC7-513A74AA3630}"/>
               </a:ext>
             </a:extLst>
           </p:cNvPr>
@@ -4701,7 +4703,7 @@
           <p:cNvPr id="51" name="Conector recto de flecha 50">
             <a:extLst>
               <a:ext uri="{FF2B5EF4-FFF2-40B4-BE49-F238E27FC236}">
-                <a16:creationId xmlns:a16="http://schemas.microsoft.com/office/drawing/2014/main" xmlns="" id="{7DD1A461-975D-4C28-BA2C-3EC859AA44D0}"/>
+                <a16:creationId xmlns="" xmlns:a16="http://schemas.microsoft.com/office/drawing/2014/main" id="{7DD1A461-975D-4C28-BA2C-3EC859AA44D0}"/>
               </a:ext>
             </a:extLst>
           </p:cNvPr>
@@ -4743,7 +4745,7 @@
           <p:cNvPr id="53" name="Conector recto de flecha 52">
             <a:extLst>
               <a:ext uri="{FF2B5EF4-FFF2-40B4-BE49-F238E27FC236}">
-                <a16:creationId xmlns:a16="http://schemas.microsoft.com/office/drawing/2014/main" xmlns="" id="{6987A33A-B7B1-44A7-B40A-9C0B49AAFE08}"/>
+                <a16:creationId xmlns="" xmlns:a16="http://schemas.microsoft.com/office/drawing/2014/main" id="{6987A33A-B7B1-44A7-B40A-9C0B49AAFE08}"/>
               </a:ext>
             </a:extLst>
           </p:cNvPr>
@@ -4786,7 +4788,7 @@
           <p:cNvPr id="55" name="Conector recto de flecha 54">
             <a:extLst>
               <a:ext uri="{FF2B5EF4-FFF2-40B4-BE49-F238E27FC236}">
-                <a16:creationId xmlns:a16="http://schemas.microsoft.com/office/drawing/2014/main" xmlns="" id="{7AB2D6BD-8892-4875-A672-5256B6270392}"/>
+                <a16:creationId xmlns="" xmlns:a16="http://schemas.microsoft.com/office/drawing/2014/main" id="{7AB2D6BD-8892-4875-A672-5256B6270392}"/>
               </a:ext>
             </a:extLst>
           </p:cNvPr>
@@ -4829,7 +4831,7 @@
           <p:cNvPr id="57" name="Conector recto de flecha 56">
             <a:extLst>
               <a:ext uri="{FF2B5EF4-FFF2-40B4-BE49-F238E27FC236}">
-                <a16:creationId xmlns:a16="http://schemas.microsoft.com/office/drawing/2014/main" xmlns="" id="{0913957E-AEB6-4317-96FF-E8269C4ED410}"/>
+                <a16:creationId xmlns="" xmlns:a16="http://schemas.microsoft.com/office/drawing/2014/main" id="{0913957E-AEB6-4317-96FF-E8269C4ED410}"/>
               </a:ext>
             </a:extLst>
           </p:cNvPr>
@@ -4872,7 +4874,7 @@
           <p:cNvPr id="59" name="Conector recto de flecha 58">
             <a:extLst>
               <a:ext uri="{FF2B5EF4-FFF2-40B4-BE49-F238E27FC236}">
-                <a16:creationId xmlns:a16="http://schemas.microsoft.com/office/drawing/2014/main" xmlns="" id="{B2330C9D-3D5D-4574-B2A0-7D0BF47ADAA2}"/>
+                <a16:creationId xmlns="" xmlns:a16="http://schemas.microsoft.com/office/drawing/2014/main" id="{B2330C9D-3D5D-4574-B2A0-7D0BF47ADAA2}"/>
               </a:ext>
             </a:extLst>
           </p:cNvPr>
@@ -4915,7 +4917,7 @@
           <p:cNvPr id="61" name="Conector recto de flecha 60">
             <a:extLst>
               <a:ext uri="{FF2B5EF4-FFF2-40B4-BE49-F238E27FC236}">
-                <a16:creationId xmlns:a16="http://schemas.microsoft.com/office/drawing/2014/main" xmlns="" id="{73135A68-6061-4BF9-AC3E-B7A8D945A409}"/>
+                <a16:creationId xmlns="" xmlns:a16="http://schemas.microsoft.com/office/drawing/2014/main" id="{73135A68-6061-4BF9-AC3E-B7A8D945A409}"/>
               </a:ext>
             </a:extLst>
           </p:cNvPr>
@@ -4958,7 +4960,7 @@
           <p:cNvPr id="63" name="Conector recto de flecha 62">
             <a:extLst>
               <a:ext uri="{FF2B5EF4-FFF2-40B4-BE49-F238E27FC236}">
-                <a16:creationId xmlns:a16="http://schemas.microsoft.com/office/drawing/2014/main" xmlns="" id="{220D600A-FE34-4A42-BDE4-C9DC4B5DE18A}"/>
+                <a16:creationId xmlns="" xmlns:a16="http://schemas.microsoft.com/office/drawing/2014/main" id="{220D600A-FE34-4A42-BDE4-C9DC4B5DE18A}"/>
               </a:ext>
             </a:extLst>
           </p:cNvPr>
@@ -5001,7 +5003,7 @@
           <p:cNvPr id="65" name="Conector recto de flecha 64">
             <a:extLst>
               <a:ext uri="{FF2B5EF4-FFF2-40B4-BE49-F238E27FC236}">
-                <a16:creationId xmlns:a16="http://schemas.microsoft.com/office/drawing/2014/main" xmlns="" id="{359F9930-F815-477B-828E-4703F28E315F}"/>
+                <a16:creationId xmlns="" xmlns:a16="http://schemas.microsoft.com/office/drawing/2014/main" id="{359F9930-F815-477B-828E-4703F28E315F}"/>
               </a:ext>
             </a:extLst>
           </p:cNvPr>
@@ -5044,7 +5046,7 @@
           <p:cNvPr id="67" name="Conector recto de flecha 66">
             <a:extLst>
               <a:ext uri="{FF2B5EF4-FFF2-40B4-BE49-F238E27FC236}">
-                <a16:creationId xmlns:a16="http://schemas.microsoft.com/office/drawing/2014/main" xmlns="" id="{2554C9D8-34BF-4D2E-854E-707F93740976}"/>
+                <a16:creationId xmlns="" xmlns:a16="http://schemas.microsoft.com/office/drawing/2014/main" id="{2554C9D8-34BF-4D2E-854E-707F93740976}"/>
               </a:ext>
             </a:extLst>
           </p:cNvPr>
@@ -5087,7 +5089,7 @@
           <p:cNvPr id="69" name="Conector recto de flecha 68">
             <a:extLst>
               <a:ext uri="{FF2B5EF4-FFF2-40B4-BE49-F238E27FC236}">
-                <a16:creationId xmlns:a16="http://schemas.microsoft.com/office/drawing/2014/main" xmlns="" id="{2981EFFC-F0FD-4B65-8F15-A583FAC88EB9}"/>
+                <a16:creationId xmlns="" xmlns:a16="http://schemas.microsoft.com/office/drawing/2014/main" id="{2981EFFC-F0FD-4B65-8F15-A583FAC88EB9}"/>
               </a:ext>
             </a:extLst>
           </p:cNvPr>
@@ -5130,7 +5132,7 @@
           <p:cNvPr id="71" name="Conector recto de flecha 70">
             <a:extLst>
               <a:ext uri="{FF2B5EF4-FFF2-40B4-BE49-F238E27FC236}">
-                <a16:creationId xmlns:a16="http://schemas.microsoft.com/office/drawing/2014/main" xmlns="" id="{723399BA-F841-4387-906B-8D3887BC0B6C}"/>
+                <a16:creationId xmlns="" xmlns:a16="http://schemas.microsoft.com/office/drawing/2014/main" id="{723399BA-F841-4387-906B-8D3887BC0B6C}"/>
               </a:ext>
             </a:extLst>
           </p:cNvPr>
@@ -5172,7 +5174,7 @@
           <p:cNvPr id="73" name="Conector recto de flecha 72">
             <a:extLst>
               <a:ext uri="{FF2B5EF4-FFF2-40B4-BE49-F238E27FC236}">
-                <a16:creationId xmlns:a16="http://schemas.microsoft.com/office/drawing/2014/main" xmlns="" id="{3C94720E-944E-4006-A108-F5E321E7FDBA}"/>
+                <a16:creationId xmlns="" xmlns:a16="http://schemas.microsoft.com/office/drawing/2014/main" id="{3C94720E-944E-4006-A108-F5E321E7FDBA}"/>
               </a:ext>
             </a:extLst>
           </p:cNvPr>
@@ -5215,7 +5217,7 @@
           <p:cNvPr id="75" name="Conector recto de flecha 74">
             <a:extLst>
               <a:ext uri="{FF2B5EF4-FFF2-40B4-BE49-F238E27FC236}">
-                <a16:creationId xmlns:a16="http://schemas.microsoft.com/office/drawing/2014/main" xmlns="" id="{639E0549-7295-40CF-8076-EAF0AC473F5B}"/>
+                <a16:creationId xmlns="" xmlns:a16="http://schemas.microsoft.com/office/drawing/2014/main" id="{639E0549-7295-40CF-8076-EAF0AC473F5B}"/>
               </a:ext>
             </a:extLst>
           </p:cNvPr>
@@ -5258,7 +5260,7 @@
           <p:cNvPr id="77" name="Conector recto de flecha 76">
             <a:extLst>
               <a:ext uri="{FF2B5EF4-FFF2-40B4-BE49-F238E27FC236}">
-                <a16:creationId xmlns:a16="http://schemas.microsoft.com/office/drawing/2014/main" xmlns="" id="{82F99B2A-EB93-41A8-8879-CB4D20D29206}"/>
+                <a16:creationId xmlns="" xmlns:a16="http://schemas.microsoft.com/office/drawing/2014/main" id="{82F99B2A-EB93-41A8-8879-CB4D20D29206}"/>
               </a:ext>
             </a:extLst>
           </p:cNvPr>
@@ -5301,7 +5303,7 @@
           <p:cNvPr id="103" name="Conector: curvado 102">
             <a:extLst>
               <a:ext uri="{FF2B5EF4-FFF2-40B4-BE49-F238E27FC236}">
-                <a16:creationId xmlns:a16="http://schemas.microsoft.com/office/drawing/2014/main" xmlns="" id="{437937ED-C4BA-410F-930C-A28E3D33FCC0}"/>
+                <a16:creationId xmlns="" xmlns:a16="http://schemas.microsoft.com/office/drawing/2014/main" id="{437937ED-C4BA-410F-930C-A28E3D33FCC0}"/>
               </a:ext>
             </a:extLst>
           </p:cNvPr>
@@ -5346,7 +5348,7 @@
           <p:cNvPr id="2" name="CuadroTexto 1">
             <a:extLst>
               <a:ext uri="{FF2B5EF4-FFF2-40B4-BE49-F238E27FC236}">
-                <a16:creationId xmlns:a16="http://schemas.microsoft.com/office/drawing/2014/main" xmlns="" id="{0B1B3F42-5929-4709-B443-042C12EC69F1}"/>
+                <a16:creationId xmlns="" xmlns:a16="http://schemas.microsoft.com/office/drawing/2014/main" id="{0B1B3F42-5929-4709-B443-042C12EC69F1}"/>
               </a:ext>
             </a:extLst>
           </p:cNvPr>
@@ -5493,7 +5495,7 @@
           <p:cNvPr id="4" name="Conector: angular 3">
             <a:extLst>
               <a:ext uri="{FF2B5EF4-FFF2-40B4-BE49-F238E27FC236}">
-                <a16:creationId xmlns:a16="http://schemas.microsoft.com/office/drawing/2014/main" xmlns="" id="{F8EE469A-2024-4BAB-9ADB-9858EE43919E}"/>
+                <a16:creationId xmlns="" xmlns:a16="http://schemas.microsoft.com/office/drawing/2014/main" id="{F8EE469A-2024-4BAB-9ADB-9858EE43919E}"/>
               </a:ext>
             </a:extLst>
           </p:cNvPr>
@@ -5534,7 +5536,7 @@
           <p:cNvPr id="6" name="Conector: angular 5">
             <a:extLst>
               <a:ext uri="{FF2B5EF4-FFF2-40B4-BE49-F238E27FC236}">
-                <a16:creationId xmlns:a16="http://schemas.microsoft.com/office/drawing/2014/main" xmlns="" id="{BF5238D3-F5B9-4122-AE74-FC099014646B}"/>
+                <a16:creationId xmlns="" xmlns:a16="http://schemas.microsoft.com/office/drawing/2014/main" id="{BF5238D3-F5B9-4122-AE74-FC099014646B}"/>
               </a:ext>
             </a:extLst>
           </p:cNvPr>
@@ -6099,12 +6101,641 @@
           <a:chExt cx="0" cy="0"/>
         </a:xfrm>
       </p:grpSpPr>
+      <p:graphicFrame>
+        <p:nvGraphicFramePr>
+          <p:cNvPr id="4" name="Tabla 3"/>
+          <p:cNvGraphicFramePr>
+            <a:graphicFrameLocks noGrp="1"/>
+          </p:cNvGraphicFramePr>
+          <p:nvPr>
+            <p:extLst>
+              <p:ext uri="{D42A27DB-BD31-4B8C-83A1-F6EECF244321}">
+                <p14:modId xmlns:p14="http://schemas.microsoft.com/office/powerpoint/2010/main" val="1907291528"/>
+              </p:ext>
+            </p:extLst>
+          </p:nvPr>
+        </p:nvGraphicFramePr>
+        <p:xfrm>
+          <a:off x="431802" y="684728"/>
+          <a:ext cx="7171265" cy="3761274"/>
+        </p:xfrm>
+        <a:graphic>
+          <a:graphicData uri="http://schemas.openxmlformats.org/drawingml/2006/table">
+            <a:tbl>
+              <a:tblPr firstRow="1" bandRow="1">
+                <a:tableStyleId>{5C22544A-7EE6-4342-B048-85BDC9FD1C3A}</a:tableStyleId>
+              </a:tblPr>
+              <a:tblGrid>
+                <a:gridCol w="1100665"/>
+                <a:gridCol w="1767841"/>
+                <a:gridCol w="1434253"/>
+                <a:gridCol w="1434253"/>
+                <a:gridCol w="1434253"/>
+              </a:tblGrid>
+              <a:tr h="638351">
+                <a:tc>
+                  <a:txBody>
+                    <a:bodyPr/>
+                    <a:lstStyle/>
+                    <a:p>
+                      <a:r>
+                        <a:rPr lang="es-AR" dirty="0" smtClean="0"/>
+                        <a:t>CASO</a:t>
+                      </a:r>
+                      <a:r>
+                        <a:rPr lang="es-AR" baseline="0" dirty="0" smtClean="0"/>
+                        <a:t> CAMINO</a:t>
+                      </a:r>
+                      <a:endParaRPr lang="es-AR" dirty="0"/>
+                    </a:p>
+                  </a:txBody>
+                  <a:tcPr/>
+                </a:tc>
+                <a:tc>
+                  <a:txBody>
+                    <a:bodyPr/>
+                    <a:lstStyle/>
+                    <a:p>
+                      <a:r>
+                        <a:rPr lang="es-AR" dirty="0" smtClean="0"/>
+                        <a:t>L1</a:t>
+                      </a:r>
+                      <a:endParaRPr lang="es-AR" dirty="0"/>
+                    </a:p>
+                  </a:txBody>
+                  <a:tcPr/>
+                </a:tc>
+                <a:tc>
+                  <a:txBody>
+                    <a:bodyPr/>
+                    <a:lstStyle/>
+                    <a:p>
+                      <a:r>
+                        <a:rPr lang="es-AR" dirty="0" smtClean="0"/>
+                        <a:t>L2</a:t>
+                      </a:r>
+                      <a:endParaRPr lang="es-AR" dirty="0"/>
+                    </a:p>
+                  </a:txBody>
+                  <a:tcPr/>
+                </a:tc>
+                <a:tc>
+                  <a:txBody>
+                    <a:bodyPr/>
+                    <a:lstStyle/>
+                    <a:p>
+                      <a:r>
+                        <a:rPr lang="es-AR" dirty="0" smtClean="0"/>
+                        <a:t>L3</a:t>
+                      </a:r>
+                      <a:endParaRPr lang="es-AR" dirty="0"/>
+                    </a:p>
+                  </a:txBody>
+                  <a:tcPr/>
+                </a:tc>
+                <a:tc>
+                  <a:txBody>
+                    <a:bodyPr/>
+                    <a:lstStyle/>
+                    <a:p>
+                      <a:r>
+                        <a:rPr lang="es-AR" dirty="0" smtClean="0"/>
+                        <a:t>Resultado Obtenido</a:t>
+                      </a:r>
+                      <a:endParaRPr lang="es-AR" dirty="0"/>
+                    </a:p>
+                  </a:txBody>
+                  <a:tcPr/>
+                </a:tc>
+              </a:tr>
+              <a:tr h="369838">
+                <a:tc>
+                  <a:txBody>
+                    <a:bodyPr/>
+                    <a:lstStyle/>
+                    <a:p>
+                      <a:r>
+                        <a:rPr lang="es-AR" dirty="0" smtClean="0"/>
+                        <a:t>A</a:t>
+                      </a:r>
+                      <a:endParaRPr lang="es-AR" dirty="0"/>
+                    </a:p>
+                  </a:txBody>
+                  <a:tcPr/>
+                </a:tc>
+                <a:tc>
+                  <a:txBody>
+                    <a:bodyPr/>
+                    <a:lstStyle/>
+                    <a:p>
+                      <a:endParaRPr lang="es-AR" dirty="0"/>
+                    </a:p>
+                  </a:txBody>
+                  <a:tcPr/>
+                </a:tc>
+                <a:tc>
+                  <a:txBody>
+                    <a:bodyPr/>
+                    <a:lstStyle/>
+                    <a:p>
+                      <a:endParaRPr lang="es-AR"/>
+                    </a:p>
+                  </a:txBody>
+                  <a:tcPr/>
+                </a:tc>
+                <a:tc>
+                  <a:txBody>
+                    <a:bodyPr/>
+                    <a:lstStyle/>
+                    <a:p>
+                      <a:endParaRPr lang="es-AR"/>
+                    </a:p>
+                  </a:txBody>
+                  <a:tcPr/>
+                </a:tc>
+                <a:tc>
+                  <a:txBody>
+                    <a:bodyPr/>
+                    <a:lstStyle/>
+                    <a:p>
+                      <a:endParaRPr lang="es-AR" dirty="0"/>
+                    </a:p>
+                  </a:txBody>
+                  <a:tcPr/>
+                </a:tc>
+              </a:tr>
+              <a:tr h="638351">
+                <a:tc>
+                  <a:txBody>
+                    <a:bodyPr/>
+                    <a:lstStyle/>
+                    <a:p>
+                      <a:r>
+                        <a:rPr lang="es-AR" dirty="0" smtClean="0"/>
+                        <a:t>B</a:t>
+                      </a:r>
+                      <a:endParaRPr lang="es-AR" dirty="0"/>
+                    </a:p>
+                  </a:txBody>
+                  <a:tcPr/>
+                </a:tc>
+                <a:tc>
+                  <a:txBody>
+                    <a:bodyPr/>
+                    <a:lstStyle/>
+                    <a:p>
+                      <a:r>
+                        <a:rPr lang="es-AR" dirty="0" smtClean="0"/>
+                        <a:t>1</a:t>
+                      </a:r>
+                      <a:endParaRPr lang="es-AR" dirty="0"/>
+                    </a:p>
+                  </a:txBody>
+                  <a:tcPr/>
+                </a:tc>
+                <a:tc>
+                  <a:txBody>
+                    <a:bodyPr/>
+                    <a:lstStyle/>
+                    <a:p>
+                      <a:r>
+                        <a:rPr lang="es-AR" dirty="0" smtClean="0"/>
+                        <a:t>2</a:t>
+                      </a:r>
+                      <a:endParaRPr lang="es-AR" dirty="0"/>
+                    </a:p>
+                  </a:txBody>
+                  <a:tcPr/>
+                </a:tc>
+                <a:tc>
+                  <a:txBody>
+                    <a:bodyPr/>
+                    <a:lstStyle/>
+                    <a:p>
+                      <a:endParaRPr lang="es-AR" dirty="0"/>
+                    </a:p>
+                  </a:txBody>
+                  <a:tcPr/>
+                </a:tc>
+                <a:tc>
+                  <a:txBody>
+                    <a:bodyPr/>
+                    <a:lstStyle/>
+                    <a:p>
+                      <a:r>
+                        <a:rPr lang="es-AR" dirty="0" smtClean="0"/>
+                        <a:t>No Hay 3</a:t>
+                      </a:r>
+                      <a:r>
+                        <a:rPr lang="es-AR" baseline="0" dirty="0" smtClean="0"/>
+                        <a:t> Lados</a:t>
+                      </a:r>
+                      <a:endParaRPr lang="es-AR" dirty="0"/>
+                    </a:p>
+                  </a:txBody>
+                  <a:tcPr/>
+                </a:tc>
+              </a:tr>
+              <a:tr h="369838">
+                <a:tc>
+                  <a:txBody>
+                    <a:bodyPr/>
+                    <a:lstStyle/>
+                    <a:p>
+                      <a:r>
+                        <a:rPr lang="es-AR" dirty="0" smtClean="0"/>
+                        <a:t>C</a:t>
+                      </a:r>
+                      <a:endParaRPr lang="es-AR" dirty="0"/>
+                    </a:p>
+                  </a:txBody>
+                  <a:tcPr/>
+                </a:tc>
+                <a:tc>
+                  <a:txBody>
+                    <a:bodyPr/>
+                    <a:lstStyle/>
+                    <a:p>
+                      <a:r>
+                        <a:rPr lang="es-AR" dirty="0" smtClean="0"/>
+                        <a:t>-1</a:t>
+                      </a:r>
+                      <a:endParaRPr lang="es-AR" dirty="0"/>
+                    </a:p>
+                  </a:txBody>
+                  <a:tcPr/>
+                </a:tc>
+                <a:tc>
+                  <a:txBody>
+                    <a:bodyPr/>
+                    <a:lstStyle/>
+                    <a:p>
+                      <a:r>
+                        <a:rPr lang="es-AR" dirty="0" smtClean="0"/>
+                        <a:t>2</a:t>
+                      </a:r>
+                      <a:endParaRPr lang="es-AR" dirty="0"/>
+                    </a:p>
+                  </a:txBody>
+                  <a:tcPr/>
+                </a:tc>
+                <a:tc>
+                  <a:txBody>
+                    <a:bodyPr/>
+                    <a:lstStyle/>
+                    <a:p>
+                      <a:r>
+                        <a:rPr lang="es-AR" dirty="0" smtClean="0"/>
+                        <a:t>5</a:t>
+                      </a:r>
+                      <a:endParaRPr lang="es-AR" dirty="0"/>
+                    </a:p>
+                  </a:txBody>
+                  <a:tcPr/>
+                </a:tc>
+                <a:tc>
+                  <a:txBody>
+                    <a:bodyPr/>
+                    <a:lstStyle/>
+                    <a:p>
+                      <a:r>
+                        <a:rPr lang="es-AR" dirty="0" smtClean="0"/>
+                        <a:t>Números no validos</a:t>
+                      </a:r>
+                      <a:endParaRPr lang="es-AR" dirty="0"/>
+                    </a:p>
+                  </a:txBody>
+                  <a:tcPr/>
+                </a:tc>
+              </a:tr>
+              <a:tr h="369838">
+                <a:tc>
+                  <a:txBody>
+                    <a:bodyPr/>
+                    <a:lstStyle/>
+                    <a:p>
+                      <a:r>
+                        <a:rPr lang="es-AR" dirty="0" smtClean="0"/>
+                        <a:t>D</a:t>
+                      </a:r>
+                      <a:endParaRPr lang="es-AR" dirty="0"/>
+                    </a:p>
+                  </a:txBody>
+                  <a:tcPr/>
+                </a:tc>
+                <a:tc>
+                  <a:txBody>
+                    <a:bodyPr/>
+                    <a:lstStyle/>
+                    <a:p>
+                      <a:r>
+                        <a:rPr lang="es-AR" dirty="0" smtClean="0"/>
+                        <a:t>2</a:t>
+                      </a:r>
+                      <a:endParaRPr lang="es-AR" dirty="0"/>
+                    </a:p>
+                  </a:txBody>
+                  <a:tcPr/>
+                </a:tc>
+                <a:tc>
+                  <a:txBody>
+                    <a:bodyPr/>
+                    <a:lstStyle/>
+                    <a:p>
+                      <a:r>
+                        <a:rPr lang="es-AR" dirty="0" smtClean="0"/>
+                        <a:t>5</a:t>
+                      </a:r>
+                      <a:endParaRPr lang="es-AR" dirty="0"/>
+                    </a:p>
+                  </a:txBody>
+                  <a:tcPr/>
+                </a:tc>
+                <a:tc>
+                  <a:txBody>
+                    <a:bodyPr/>
+                    <a:lstStyle/>
+                    <a:p>
+                      <a:r>
+                        <a:rPr lang="es-AR" dirty="0" smtClean="0"/>
+                        <a:t>2</a:t>
+                      </a:r>
+                      <a:endParaRPr lang="es-AR" dirty="0"/>
+                    </a:p>
+                  </a:txBody>
+                  <a:tcPr/>
+                </a:tc>
+                <a:tc>
+                  <a:txBody>
+                    <a:bodyPr/>
+                    <a:lstStyle/>
+                    <a:p>
+                      <a:r>
+                        <a:rPr lang="es-AR" dirty="0" smtClean="0"/>
+                        <a:t>No Triangulo</a:t>
+                      </a:r>
+                      <a:endParaRPr lang="es-AR" dirty="0"/>
+                    </a:p>
+                  </a:txBody>
+                  <a:tcPr/>
+                </a:tc>
+              </a:tr>
+              <a:tr h="369838">
+                <a:tc>
+                  <a:txBody>
+                    <a:bodyPr/>
+                    <a:lstStyle/>
+                    <a:p>
+                      <a:r>
+                        <a:rPr lang="es-AR" dirty="0" smtClean="0"/>
+                        <a:t>E</a:t>
+                      </a:r>
+                      <a:endParaRPr lang="es-AR" dirty="0"/>
+                    </a:p>
+                  </a:txBody>
+                  <a:tcPr/>
+                </a:tc>
+                <a:tc>
+                  <a:txBody>
+                    <a:bodyPr/>
+                    <a:lstStyle/>
+                    <a:p>
+                      <a:r>
+                        <a:rPr lang="es-AR" dirty="0" smtClean="0"/>
+                        <a:t>5</a:t>
+                      </a:r>
+                      <a:endParaRPr lang="es-AR" dirty="0"/>
+                    </a:p>
+                  </a:txBody>
+                  <a:tcPr/>
+                </a:tc>
+                <a:tc>
+                  <a:txBody>
+                    <a:bodyPr/>
+                    <a:lstStyle/>
+                    <a:p>
+                      <a:r>
+                        <a:rPr lang="es-AR" dirty="0" smtClean="0"/>
+                        <a:t>5</a:t>
+                      </a:r>
+                      <a:endParaRPr lang="es-AR" dirty="0"/>
+                    </a:p>
+                  </a:txBody>
+                  <a:tcPr/>
+                </a:tc>
+                <a:tc>
+                  <a:txBody>
+                    <a:bodyPr/>
+                    <a:lstStyle/>
+                    <a:p>
+                      <a:r>
+                        <a:rPr lang="es-AR" dirty="0" smtClean="0"/>
+                        <a:t>5</a:t>
+                      </a:r>
+                      <a:endParaRPr lang="es-AR" dirty="0"/>
+                    </a:p>
+                  </a:txBody>
+                  <a:tcPr/>
+                </a:tc>
+                <a:tc>
+                  <a:txBody>
+                    <a:bodyPr/>
+                    <a:lstStyle/>
+                    <a:p>
+                      <a:r>
+                        <a:rPr lang="es-AR" dirty="0" smtClean="0"/>
+                        <a:t>Equilátero</a:t>
+                      </a:r>
+                      <a:endParaRPr lang="es-AR" dirty="0"/>
+                    </a:p>
+                  </a:txBody>
+                  <a:tcPr/>
+                </a:tc>
+              </a:tr>
+              <a:tr h="330822">
+                <a:tc>
+                  <a:txBody>
+                    <a:bodyPr/>
+                    <a:lstStyle/>
+                    <a:p>
+                      <a:r>
+                        <a:rPr lang="es-AR" dirty="0" smtClean="0"/>
+                        <a:t>F</a:t>
+                      </a:r>
+                      <a:endParaRPr lang="es-AR" dirty="0"/>
+                    </a:p>
+                  </a:txBody>
+                  <a:tcPr/>
+                </a:tc>
+                <a:tc>
+                  <a:txBody>
+                    <a:bodyPr/>
+                    <a:lstStyle/>
+                    <a:p>
+                      <a:r>
+                        <a:rPr lang="es-AR" dirty="0" smtClean="0"/>
+                        <a:t>7</a:t>
+                      </a:r>
+                      <a:endParaRPr lang="es-AR" dirty="0"/>
+                    </a:p>
+                  </a:txBody>
+                  <a:tcPr/>
+                </a:tc>
+                <a:tc>
+                  <a:txBody>
+                    <a:bodyPr/>
+                    <a:lstStyle/>
+                    <a:p>
+                      <a:r>
+                        <a:rPr lang="es-AR" dirty="0" smtClean="0"/>
+                        <a:t>5</a:t>
+                      </a:r>
+                      <a:endParaRPr lang="es-AR" dirty="0"/>
+                    </a:p>
+                  </a:txBody>
+                  <a:tcPr/>
+                </a:tc>
+                <a:tc>
+                  <a:txBody>
+                    <a:bodyPr/>
+                    <a:lstStyle/>
+                    <a:p>
+                      <a:r>
+                        <a:rPr lang="es-AR" dirty="0" smtClean="0"/>
+                        <a:t>5</a:t>
+                      </a:r>
+                      <a:endParaRPr lang="es-AR" dirty="0"/>
+                    </a:p>
+                  </a:txBody>
+                  <a:tcPr/>
+                </a:tc>
+                <a:tc>
+                  <a:txBody>
+                    <a:bodyPr/>
+                    <a:lstStyle/>
+                    <a:p>
+                      <a:r>
+                        <a:rPr lang="es-AR" smtClean="0"/>
+                        <a:t>Isósceles</a:t>
+                      </a:r>
+                      <a:endParaRPr lang="es-AR" dirty="0"/>
+                    </a:p>
+                  </a:txBody>
+                  <a:tcPr/>
+                </a:tc>
+              </a:tr>
+              <a:tr h="330822">
+                <a:tc>
+                  <a:txBody>
+                    <a:bodyPr/>
+                    <a:lstStyle/>
+                    <a:p>
+                      <a:r>
+                        <a:rPr lang="es-AR" dirty="0" smtClean="0"/>
+                        <a:t>G</a:t>
+                      </a:r>
+                      <a:endParaRPr lang="es-AR" dirty="0"/>
+                    </a:p>
+                  </a:txBody>
+                  <a:tcPr/>
+                </a:tc>
+                <a:tc>
+                  <a:txBody>
+                    <a:bodyPr/>
+                    <a:lstStyle/>
+                    <a:p>
+                      <a:r>
+                        <a:rPr lang="es-AR" dirty="0" smtClean="0"/>
+                        <a:t>5</a:t>
+                      </a:r>
+                      <a:endParaRPr lang="es-AR" dirty="0"/>
+                    </a:p>
+                  </a:txBody>
+                  <a:tcPr/>
+                </a:tc>
+                <a:tc>
+                  <a:txBody>
+                    <a:bodyPr/>
+                    <a:lstStyle/>
+                    <a:p>
+                      <a:r>
+                        <a:rPr lang="es-AR" dirty="0" smtClean="0"/>
+                        <a:t>6</a:t>
+                      </a:r>
+                      <a:endParaRPr lang="es-AR" dirty="0"/>
+                    </a:p>
+                  </a:txBody>
+                  <a:tcPr/>
+                </a:tc>
+                <a:tc>
+                  <a:txBody>
+                    <a:bodyPr/>
+                    <a:lstStyle/>
+                    <a:p>
+                      <a:r>
+                        <a:rPr lang="es-AR" dirty="0" smtClean="0"/>
+                        <a:t>7</a:t>
+                      </a:r>
+                      <a:endParaRPr lang="es-AR" dirty="0"/>
+                    </a:p>
+                  </a:txBody>
+                  <a:tcPr/>
+                </a:tc>
+                <a:tc>
+                  <a:txBody>
+                    <a:bodyPr/>
+                    <a:lstStyle/>
+                    <a:p>
+                      <a:r>
+                        <a:rPr lang="es-AR" dirty="0" smtClean="0"/>
+                        <a:t>Escaleno</a:t>
+                      </a:r>
+                      <a:endParaRPr lang="es-AR" dirty="0"/>
+                    </a:p>
+                  </a:txBody>
+                  <a:tcPr/>
+                </a:tc>
+              </a:tr>
+            </a:tbl>
+          </a:graphicData>
+        </a:graphic>
+      </p:graphicFrame>
+    </p:spTree>
+    <p:extLst>
+      <p:ext uri="{BB962C8B-B14F-4D97-AF65-F5344CB8AC3E}">
+        <p14:creationId xmlns:p14="http://schemas.microsoft.com/office/powerpoint/2010/main" val="1704302919"/>
+      </p:ext>
+    </p:extLst>
+  </p:cSld>
+  <p:clrMapOvr>
+    <a:masterClrMapping/>
+  </p:clrMapOvr>
+</p:sld>
+</file>
+
+<file path=ppt/slides/slide5.xml><?xml version="1.0" encoding="utf-8"?>
+<p:sld xmlns:a="http://schemas.openxmlformats.org/drawingml/2006/main" xmlns:r="http://schemas.openxmlformats.org/officeDocument/2006/relationships" xmlns:p="http://schemas.openxmlformats.org/presentationml/2006/main">
+  <p:cSld>
+    <p:spTree>
+      <p:nvGrpSpPr>
+        <p:cNvPr id="1" name=""/>
+        <p:cNvGrpSpPr/>
+        <p:nvPr/>
+      </p:nvGrpSpPr>
+      <p:grpSpPr>
+        <a:xfrm>
+          <a:off x="0" y="0"/>
+          <a:ext cx="0" cy="0"/>
+          <a:chOff x="0" y="0"/>
+          <a:chExt cx="0" cy="0"/>
+        </a:xfrm>
+      </p:grpSpPr>
       <p:pic>
         <p:nvPicPr>
           <p:cNvPr id="4" name="Imagen 3">
             <a:extLst>
               <a:ext uri="{FF2B5EF4-FFF2-40B4-BE49-F238E27FC236}">
-                <a16:creationId xmlns:a16="http://schemas.microsoft.com/office/drawing/2014/main" xmlns="" id="{360E3696-B415-4E23-9AB1-FE647E8069C4}"/>
+                <a16:creationId xmlns="" xmlns:a16="http://schemas.microsoft.com/office/drawing/2014/main" id="{360E3696-B415-4E23-9AB1-FE647E8069C4}"/>
               </a:ext>
             </a:extLst>
           </p:cNvPr>
@@ -6134,7 +6765,7 @@
           <p:cNvPr id="5" name="Imagen 4">
             <a:extLst>
               <a:ext uri="{FF2B5EF4-FFF2-40B4-BE49-F238E27FC236}">
-                <a16:creationId xmlns:a16="http://schemas.microsoft.com/office/drawing/2014/main" xmlns="" id="{4B4680B1-AD62-46E9-AB71-2D6852F68508}"/>
+                <a16:creationId xmlns="" xmlns:a16="http://schemas.microsoft.com/office/drawing/2014/main" id="{4B4680B1-AD62-46E9-AB71-2D6852F68508}"/>
               </a:ext>
             </a:extLst>
           </p:cNvPr>

</xml_diff>